<commit_message>
Update slides on concurrency
</commit_message>
<xml_diff>
--- a/ex/416-F23/staging/416-F23/lectures/10-locks-CVs.pptx
+++ b/ex/416-F23/staging/416-F23/lectures/10-locks-CVs.pptx
@@ -247,7 +247,7 @@
           <a:p>
             <a:fld id="{973C490B-630B-7F46-B6FE-05D0FD1689A8}" type="datetimeFigureOut">
               <a:rPr lang="en-US" smtClean="0"/>
-              <a:t>11/15/23</a:t>
+              <a:t>11/16/23</a:t>
             </a:fld>
             <a:endParaRPr lang="en-US"/>
           </a:p>
@@ -722,7 +722,7 @@
           <a:p>
             <a:fld id="{DEDCE603-2B12-5844-BEA7-E98E825B38C7}" type="datetimeFigureOut">
               <a:rPr lang="en-US" smtClean="0"/>
-              <a:t>11/15/23</a:t>
+              <a:t>11/16/23</a:t>
             </a:fld>
             <a:endParaRPr lang="en-US"/>
           </a:p>
@@ -920,7 +920,7 @@
           <a:p>
             <a:fld id="{DEDCE603-2B12-5844-BEA7-E98E825B38C7}" type="datetimeFigureOut">
               <a:rPr lang="en-US" smtClean="0"/>
-              <a:t>11/15/23</a:t>
+              <a:t>11/16/23</a:t>
             </a:fld>
             <a:endParaRPr lang="en-US"/>
           </a:p>
@@ -1128,7 +1128,7 @@
           <a:p>
             <a:fld id="{DEDCE603-2B12-5844-BEA7-E98E825B38C7}" type="datetimeFigureOut">
               <a:rPr lang="en-US" smtClean="0"/>
-              <a:t>11/15/23</a:t>
+              <a:t>11/16/23</a:t>
             </a:fld>
             <a:endParaRPr lang="en-US"/>
           </a:p>
@@ -1500,7 +1500,7 @@
           <a:p>
             <a:fld id="{DEDCE603-2B12-5844-BEA7-E98E825B38C7}" type="datetimeFigureOut">
               <a:rPr lang="en-US" smtClean="0"/>
-              <a:t>11/15/23</a:t>
+              <a:t>11/16/23</a:t>
             </a:fld>
             <a:endParaRPr lang="en-US"/>
           </a:p>
@@ -1775,7 +1775,7 @@
           <a:p>
             <a:fld id="{DEDCE603-2B12-5844-BEA7-E98E825B38C7}" type="datetimeFigureOut">
               <a:rPr lang="en-US" smtClean="0"/>
-              <a:t>11/15/23</a:t>
+              <a:t>11/16/23</a:t>
             </a:fld>
             <a:endParaRPr lang="en-US"/>
           </a:p>
@@ -2040,7 +2040,7 @@
           <a:p>
             <a:fld id="{DEDCE603-2B12-5844-BEA7-E98E825B38C7}" type="datetimeFigureOut">
               <a:rPr lang="en-US" smtClean="0"/>
-              <a:t>11/15/23</a:t>
+              <a:t>11/16/23</a:t>
             </a:fld>
             <a:endParaRPr lang="en-US"/>
           </a:p>
@@ -2452,7 +2452,7 @@
           <a:p>
             <a:fld id="{DEDCE603-2B12-5844-BEA7-E98E825B38C7}" type="datetimeFigureOut">
               <a:rPr lang="en-US" smtClean="0"/>
-              <a:t>11/15/23</a:t>
+              <a:t>11/16/23</a:t>
             </a:fld>
             <a:endParaRPr lang="en-US"/>
           </a:p>
@@ -2593,7 +2593,7 @@
           <a:p>
             <a:fld id="{DEDCE603-2B12-5844-BEA7-E98E825B38C7}" type="datetimeFigureOut">
               <a:rPr lang="en-US" smtClean="0"/>
-              <a:t>11/15/23</a:t>
+              <a:t>11/16/23</a:t>
             </a:fld>
             <a:endParaRPr lang="en-US"/>
           </a:p>
@@ -2706,7 +2706,7 @@
           <a:p>
             <a:fld id="{DEDCE603-2B12-5844-BEA7-E98E825B38C7}" type="datetimeFigureOut">
               <a:rPr lang="en-US" smtClean="0"/>
-              <a:t>11/15/23</a:t>
+              <a:t>11/16/23</a:t>
             </a:fld>
             <a:endParaRPr lang="en-US"/>
           </a:p>
@@ -3017,7 +3017,7 @@
           <a:p>
             <a:fld id="{DEDCE603-2B12-5844-BEA7-E98E825B38C7}" type="datetimeFigureOut">
               <a:rPr lang="en-US" smtClean="0"/>
-              <a:t>11/15/23</a:t>
+              <a:t>11/16/23</a:t>
             </a:fld>
             <a:endParaRPr lang="en-US"/>
           </a:p>
@@ -3305,7 +3305,7 @@
           <a:p>
             <a:fld id="{DEDCE603-2B12-5844-BEA7-E98E825B38C7}" type="datetimeFigureOut">
               <a:rPr lang="en-US" smtClean="0"/>
-              <a:t>11/15/23</a:t>
+              <a:t>11/16/23</a:t>
             </a:fld>
             <a:endParaRPr lang="en-US"/>
           </a:p>
@@ -3546,7 +3546,7 @@
           <a:p>
             <a:fld id="{DEDCE603-2B12-5844-BEA7-E98E825B38C7}" type="datetimeFigureOut">
               <a:rPr lang="en-US" smtClean="0"/>
-              <a:t>11/15/23</a:t>
+              <a:t>11/16/23</a:t>
             </a:fld>
             <a:endParaRPr lang="en-US"/>
           </a:p>
@@ -4115,7 +4115,7 @@
           </a:ln>
           <a:extLst>
             <a:ext uri="{C572A759-6A51-4108-AA02-DFA0A04FC94B}">
-              <ma14:wrappingTextBoxFlag xmlns:ma14="http://schemas.microsoft.com/office/mac/drawingml/2011/main" xmlns="" val="1"/>
+              <ma14:wrappingTextBoxFlag xmlns="" xmlns:ma14="http://schemas.microsoft.com/office/mac/drawingml/2011/main" val="1"/>
             </a:ext>
           </a:extLst>
         </p:spPr>
@@ -4216,7 +4216,7 @@
           </a:ln>
           <a:extLst>
             <a:ext uri="{C572A759-6A51-4108-AA02-DFA0A04FC94B}">
-              <ma14:wrappingTextBoxFlag xmlns:ma14="http://schemas.microsoft.com/office/mac/drawingml/2011/main" xmlns="" val="1"/>
+              <ma14:wrappingTextBoxFlag xmlns="" xmlns:ma14="http://schemas.microsoft.com/office/mac/drawingml/2011/main" val="1"/>
             </a:ext>
           </a:extLst>
         </p:spPr>
@@ -4349,7 +4349,7 @@
           </a:ln>
           <a:extLst>
             <a:ext uri="{C572A759-6A51-4108-AA02-DFA0A04FC94B}">
-              <ma14:wrappingTextBoxFlag xmlns:ma14="http://schemas.microsoft.com/office/mac/drawingml/2011/main" xmlns="" val="1"/>
+              <ma14:wrappingTextBoxFlag xmlns="" xmlns:ma14="http://schemas.microsoft.com/office/mac/drawingml/2011/main" val="1"/>
             </a:ext>
           </a:extLst>
         </p:spPr>
@@ -4461,7 +4461,7 @@
           </a:ln>
           <a:extLst>
             <a:ext uri="{C572A759-6A51-4108-AA02-DFA0A04FC94B}">
-              <ma14:wrappingTextBoxFlag xmlns:ma14="http://schemas.microsoft.com/office/mac/drawingml/2011/main" xmlns="" val="1"/>
+              <ma14:wrappingTextBoxFlag xmlns="" xmlns:ma14="http://schemas.microsoft.com/office/mac/drawingml/2011/main" val="1"/>
             </a:ext>
           </a:extLst>
         </p:spPr>
@@ -4569,7 +4569,7 @@
           </a:ln>
           <a:extLst>
             <a:ext uri="{C572A759-6A51-4108-AA02-DFA0A04FC94B}">
-              <ma14:wrappingTextBoxFlag xmlns:ma14="http://schemas.microsoft.com/office/mac/drawingml/2011/main" xmlns="" val="1"/>
+              <ma14:wrappingTextBoxFlag xmlns="" xmlns:ma14="http://schemas.microsoft.com/office/mac/drawingml/2011/main" val="1"/>
             </a:ext>
           </a:extLst>
         </p:spPr>
@@ -4785,7 +4785,7 @@
           </a:ln>
           <a:extLst>
             <a:ext uri="{C572A759-6A51-4108-AA02-DFA0A04FC94B}">
-              <ma14:wrappingTextBoxFlag xmlns:ma14="http://schemas.microsoft.com/office/mac/drawingml/2011/main" xmlns="" val="1"/>
+              <ma14:wrappingTextBoxFlag xmlns="" xmlns:ma14="http://schemas.microsoft.com/office/mac/drawingml/2011/main" val="1"/>
             </a:ext>
           </a:extLst>
         </p:spPr>
@@ -4925,7 +4925,7 @@
           </a:ln>
           <a:extLst>
             <a:ext uri="{C572A759-6A51-4108-AA02-DFA0A04FC94B}">
-              <ma14:wrappingTextBoxFlag xmlns:ma14="http://schemas.microsoft.com/office/mac/drawingml/2011/main" xmlns="" val="1"/>
+              <ma14:wrappingTextBoxFlag xmlns="" xmlns:ma14="http://schemas.microsoft.com/office/mac/drawingml/2011/main" val="1"/>
             </a:ext>
           </a:extLst>
         </p:spPr>
@@ -5010,7 +5010,7 @@
           </a:ln>
           <a:extLst>
             <a:ext uri="{C572A759-6A51-4108-AA02-DFA0A04FC94B}">
-              <ma14:wrappingTextBoxFlag xmlns:ma14="http://schemas.microsoft.com/office/mac/drawingml/2011/main" xmlns="" val="1"/>
+              <ma14:wrappingTextBoxFlag xmlns="" xmlns:ma14="http://schemas.microsoft.com/office/mac/drawingml/2011/main" val="1"/>
             </a:ext>
           </a:extLst>
         </p:spPr>
@@ -18512,7 +18512,7 @@
           </a:ln>
           <a:extLst>
             <a:ext uri="{C572A759-6A51-4108-AA02-DFA0A04FC94B}">
-              <ma14:wrappingTextBoxFlag xmlns="" xmlns:ma14="http://schemas.microsoft.com/office/mac/drawingml/2011/main" val="1"/>
+              <ma14:wrappingTextBoxFlag xmlns:ma14="http://schemas.microsoft.com/office/mac/drawingml/2011/main" xmlns="" val="1"/>
             </a:ext>
           </a:extLst>
         </p:spPr>
@@ -18602,7 +18602,7 @@
           </a:ln>
           <a:extLst>
             <a:ext uri="{C572A759-6A51-4108-AA02-DFA0A04FC94B}">
-              <ma14:wrappingTextBoxFlag xmlns="" xmlns:ma14="http://schemas.microsoft.com/office/mac/drawingml/2011/main" val="1"/>
+              <ma14:wrappingTextBoxFlag xmlns:ma14="http://schemas.microsoft.com/office/mac/drawingml/2011/main" xmlns="" val="1"/>
             </a:ext>
           </a:extLst>
         </p:spPr>
@@ -18692,7 +18692,7 @@
           </a:ln>
           <a:extLst>
             <a:ext uri="{C572A759-6A51-4108-AA02-DFA0A04FC94B}">
-              <ma14:wrappingTextBoxFlag xmlns="" xmlns:ma14="http://schemas.microsoft.com/office/mac/drawingml/2011/main" val="1"/>
+              <ma14:wrappingTextBoxFlag xmlns:ma14="http://schemas.microsoft.com/office/mac/drawingml/2011/main" xmlns="" val="1"/>
             </a:ext>
           </a:extLst>
         </p:spPr>
@@ -18782,7 +18782,7 @@
           </a:ln>
           <a:extLst>
             <a:ext uri="{C572A759-6A51-4108-AA02-DFA0A04FC94B}">
-              <ma14:wrappingTextBoxFlag xmlns="" xmlns:ma14="http://schemas.microsoft.com/office/mac/drawingml/2011/main" val="1"/>
+              <ma14:wrappingTextBoxFlag xmlns:ma14="http://schemas.microsoft.com/office/mac/drawingml/2011/main" xmlns="" val="1"/>
             </a:ext>
           </a:extLst>
         </p:spPr>
@@ -18878,7 +18878,7 @@
           </a:ln>
           <a:extLst>
             <a:ext uri="{C572A759-6A51-4108-AA02-DFA0A04FC94B}">
-              <ma14:wrappingTextBoxFlag xmlns="" xmlns:ma14="http://schemas.microsoft.com/office/mac/drawingml/2011/main" val="1"/>
+              <ma14:wrappingTextBoxFlag xmlns:ma14="http://schemas.microsoft.com/office/mac/drawingml/2011/main" xmlns="" val="1"/>
             </a:ext>
           </a:extLst>
         </p:spPr>
@@ -18936,7 +18936,7 @@
           </a:ln>
           <a:extLst>
             <a:ext uri="{C572A759-6A51-4108-AA02-DFA0A04FC94B}">
-              <ma14:wrappingTextBoxFlag xmlns="" xmlns:ma14="http://schemas.microsoft.com/office/mac/drawingml/2011/main" val="1"/>
+              <ma14:wrappingTextBoxFlag xmlns:ma14="http://schemas.microsoft.com/office/mac/drawingml/2011/main" xmlns="" val="1"/>
             </a:ext>
           </a:extLst>
         </p:spPr>
@@ -19058,7 +19058,7 @@
           </a:ln>
           <a:extLst>
             <a:ext uri="{C572A759-6A51-4108-AA02-DFA0A04FC94B}">
-              <ma14:wrappingTextBoxFlag xmlns="" xmlns:ma14="http://schemas.microsoft.com/office/mac/drawingml/2011/main" val="1"/>
+              <ma14:wrappingTextBoxFlag xmlns:ma14="http://schemas.microsoft.com/office/mac/drawingml/2011/main" xmlns="" val="1"/>
             </a:ext>
           </a:extLst>
         </p:spPr>
@@ -19142,7 +19142,7 @@
           </a:ln>
           <a:extLst>
             <a:ext uri="{C572A759-6A51-4108-AA02-DFA0A04FC94B}">
-              <ma14:wrappingTextBoxFlag xmlns="" xmlns:ma14="http://schemas.microsoft.com/office/mac/drawingml/2011/main" val="1"/>
+              <ma14:wrappingTextBoxFlag xmlns:ma14="http://schemas.microsoft.com/office/mac/drawingml/2011/main" xmlns="" val="1"/>
             </a:ext>
           </a:extLst>
         </p:spPr>
@@ -19226,7 +19226,7 @@
           </a:ln>
           <a:extLst>
             <a:ext uri="{C572A759-6A51-4108-AA02-DFA0A04FC94B}">
-              <ma14:wrappingTextBoxFlag xmlns="" xmlns:ma14="http://schemas.microsoft.com/office/mac/drawingml/2011/main" val="1"/>
+              <ma14:wrappingTextBoxFlag xmlns:ma14="http://schemas.microsoft.com/office/mac/drawingml/2011/main" xmlns="" val="1"/>
             </a:ext>
           </a:extLst>
         </p:spPr>
@@ -19346,7 +19346,7 @@
           </a:ln>
           <a:extLst>
             <a:ext uri="{C572A759-6A51-4108-AA02-DFA0A04FC94B}">
-              <ma14:wrappingTextBoxFlag xmlns="" xmlns:ma14="http://schemas.microsoft.com/office/mac/drawingml/2011/main" val="1"/>
+              <ma14:wrappingTextBoxFlag xmlns:ma14="http://schemas.microsoft.com/office/mac/drawingml/2011/main" xmlns="" val="1"/>
             </a:ext>
           </a:extLst>
         </p:spPr>
@@ -19430,7 +19430,7 @@
           </a:ln>
           <a:extLst>
             <a:ext uri="{C572A759-6A51-4108-AA02-DFA0A04FC94B}">
-              <ma14:wrappingTextBoxFlag xmlns="" xmlns:ma14="http://schemas.microsoft.com/office/mac/drawingml/2011/main" val="1"/>
+              <ma14:wrappingTextBoxFlag xmlns:ma14="http://schemas.microsoft.com/office/mac/drawingml/2011/main" xmlns="" val="1"/>
             </a:ext>
           </a:extLst>
         </p:spPr>
@@ -19550,7 +19550,7 @@
           </a:ln>
           <a:extLst>
             <a:ext uri="{C572A759-6A51-4108-AA02-DFA0A04FC94B}">
-              <ma14:wrappingTextBoxFlag xmlns="" xmlns:ma14="http://schemas.microsoft.com/office/mac/drawingml/2011/main" val="1"/>
+              <ma14:wrappingTextBoxFlag xmlns:ma14="http://schemas.microsoft.com/office/mac/drawingml/2011/main" xmlns="" val="1"/>
             </a:ext>
           </a:extLst>
         </p:spPr>
@@ -19634,7 +19634,7 @@
           </a:ln>
           <a:extLst>
             <a:ext uri="{C572A759-6A51-4108-AA02-DFA0A04FC94B}">
-              <ma14:wrappingTextBoxFlag xmlns="" xmlns:ma14="http://schemas.microsoft.com/office/mac/drawingml/2011/main" val="1"/>
+              <ma14:wrappingTextBoxFlag xmlns:ma14="http://schemas.microsoft.com/office/mac/drawingml/2011/main" xmlns="" val="1"/>
             </a:ext>
           </a:extLst>
         </p:spPr>
@@ -19754,7 +19754,7 @@
           </a:ln>
           <a:extLst>
             <a:ext uri="{C572A759-6A51-4108-AA02-DFA0A04FC94B}">
-              <ma14:wrappingTextBoxFlag xmlns="" xmlns:ma14="http://schemas.microsoft.com/office/mac/drawingml/2011/main" val="1"/>
+              <ma14:wrappingTextBoxFlag xmlns:ma14="http://schemas.microsoft.com/office/mac/drawingml/2011/main" xmlns="" val="1"/>
             </a:ext>
           </a:extLst>
         </p:spPr>
@@ -19838,7 +19838,7 @@
           </a:ln>
           <a:extLst>
             <a:ext uri="{C572A759-6A51-4108-AA02-DFA0A04FC94B}">
-              <ma14:wrappingTextBoxFlag xmlns="" xmlns:ma14="http://schemas.microsoft.com/office/mac/drawingml/2011/main" val="1"/>
+              <ma14:wrappingTextBoxFlag xmlns:ma14="http://schemas.microsoft.com/office/mac/drawingml/2011/main" xmlns="" val="1"/>
             </a:ext>
           </a:extLst>
         </p:spPr>
@@ -19889,7 +19889,7 @@
           </a:ln>
           <a:extLst>
             <a:ext uri="{C572A759-6A51-4108-AA02-DFA0A04FC94B}">
-              <ma14:wrappingTextBoxFlag xmlns="" xmlns:ma14="http://schemas.microsoft.com/office/mac/drawingml/2011/main" val="1"/>
+              <ma14:wrappingTextBoxFlag xmlns:ma14="http://schemas.microsoft.com/office/mac/drawingml/2011/main" xmlns="" val="1"/>
             </a:ext>
           </a:extLst>
         </p:spPr>
@@ -19947,7 +19947,7 @@
           </a:ln>
           <a:extLst>
             <a:ext uri="{C572A759-6A51-4108-AA02-DFA0A04FC94B}">
-              <ma14:wrappingTextBoxFlag xmlns="" xmlns:ma14="http://schemas.microsoft.com/office/mac/drawingml/2011/main" val="1"/>
+              <ma14:wrappingTextBoxFlag xmlns:ma14="http://schemas.microsoft.com/office/mac/drawingml/2011/main" xmlns="" val="1"/>
             </a:ext>
           </a:extLst>
         </p:spPr>
@@ -20000,7 +20000,7 @@
           </a:ln>
           <a:extLst>
             <a:ext uri="{C572A759-6A51-4108-AA02-DFA0A04FC94B}">
-              <ma14:wrappingTextBoxFlag xmlns="" xmlns:ma14="http://schemas.microsoft.com/office/mac/drawingml/2011/main" val="1"/>
+              <ma14:wrappingTextBoxFlag xmlns:ma14="http://schemas.microsoft.com/office/mac/drawingml/2011/main" xmlns="" val="1"/>
             </a:ext>
           </a:extLst>
         </p:spPr>
@@ -20058,7 +20058,7 @@
           </a:ln>
           <a:extLst>
             <a:ext uri="{C572A759-6A51-4108-AA02-DFA0A04FC94B}">
-              <ma14:wrappingTextBoxFlag xmlns="" xmlns:ma14="http://schemas.microsoft.com/office/mac/drawingml/2011/main" val="1"/>
+              <ma14:wrappingTextBoxFlag xmlns:ma14="http://schemas.microsoft.com/office/mac/drawingml/2011/main" xmlns="" val="1"/>
             </a:ext>
           </a:extLst>
         </p:spPr>
@@ -20111,7 +20111,7 @@
           </a:ln>
           <a:extLst>
             <a:ext uri="{C572A759-6A51-4108-AA02-DFA0A04FC94B}">
-              <ma14:wrappingTextBoxFlag xmlns="" xmlns:ma14="http://schemas.microsoft.com/office/mac/drawingml/2011/main" val="1"/>
+              <ma14:wrappingTextBoxFlag xmlns:ma14="http://schemas.microsoft.com/office/mac/drawingml/2011/main" xmlns="" val="1"/>
             </a:ext>
           </a:extLst>
         </p:spPr>
@@ -20169,7 +20169,7 @@
           </a:ln>
           <a:extLst>
             <a:ext uri="{C572A759-6A51-4108-AA02-DFA0A04FC94B}">
-              <ma14:wrappingTextBoxFlag xmlns="" xmlns:ma14="http://schemas.microsoft.com/office/mac/drawingml/2011/main" val="1"/>
+              <ma14:wrappingTextBoxFlag xmlns:ma14="http://schemas.microsoft.com/office/mac/drawingml/2011/main" xmlns="" val="1"/>
             </a:ext>
           </a:extLst>
         </p:spPr>
@@ -20219,7 +20219,7 @@
           </a:ln>
           <a:extLst>
             <a:ext uri="{C572A759-6A51-4108-AA02-DFA0A04FC94B}">
-              <ma14:wrappingTextBoxFlag xmlns="" xmlns:ma14="http://schemas.microsoft.com/office/mac/drawingml/2011/main" val="1"/>
+              <ma14:wrappingTextBoxFlag xmlns:ma14="http://schemas.microsoft.com/office/mac/drawingml/2011/main" xmlns="" val="1"/>
             </a:ext>
           </a:extLst>
         </p:spPr>
@@ -20308,7 +20308,7 @@
           </a:ln>
           <a:extLst>
             <a:ext uri="{C572A759-6A51-4108-AA02-DFA0A04FC94B}">
-              <ma14:wrappingTextBoxFlag xmlns="" xmlns:ma14="http://schemas.microsoft.com/office/mac/drawingml/2011/main" val="1"/>
+              <ma14:wrappingTextBoxFlag xmlns:ma14="http://schemas.microsoft.com/office/mac/drawingml/2011/main" xmlns="" val="1"/>
             </a:ext>
           </a:extLst>
         </p:spPr>
@@ -20397,7 +20397,7 @@
           </a:ln>
           <a:extLst>
             <a:ext uri="{C572A759-6A51-4108-AA02-DFA0A04FC94B}">
-              <ma14:wrappingTextBoxFlag xmlns="" xmlns:ma14="http://schemas.microsoft.com/office/mac/drawingml/2011/main" val="1"/>
+              <ma14:wrappingTextBoxFlag xmlns:ma14="http://schemas.microsoft.com/office/mac/drawingml/2011/main" xmlns="" val="1"/>
             </a:ext>
           </a:extLst>
         </p:spPr>
@@ -20486,7 +20486,7 @@
           </a:ln>
           <a:extLst>
             <a:ext uri="{C572A759-6A51-4108-AA02-DFA0A04FC94B}">
-              <ma14:wrappingTextBoxFlag xmlns="" xmlns:ma14="http://schemas.microsoft.com/office/mac/drawingml/2011/main" val="1"/>
+              <ma14:wrappingTextBoxFlag xmlns:ma14="http://schemas.microsoft.com/office/mac/drawingml/2011/main" xmlns="" val="1"/>
             </a:ext>
           </a:extLst>
         </p:spPr>
@@ -20575,7 +20575,7 @@
           </a:ln>
           <a:extLst>
             <a:ext uri="{C572A759-6A51-4108-AA02-DFA0A04FC94B}">
-              <ma14:wrappingTextBoxFlag xmlns="" xmlns:ma14="http://schemas.microsoft.com/office/mac/drawingml/2011/main" val="1"/>
+              <ma14:wrappingTextBoxFlag xmlns:ma14="http://schemas.microsoft.com/office/mac/drawingml/2011/main" xmlns="" val="1"/>
             </a:ext>
           </a:extLst>
         </p:spPr>
@@ -20664,7 +20664,7 @@
           </a:ln>
           <a:extLst>
             <a:ext uri="{C572A759-6A51-4108-AA02-DFA0A04FC94B}">
-              <ma14:wrappingTextBoxFlag xmlns="" xmlns:ma14="http://schemas.microsoft.com/office/mac/drawingml/2011/main" val="1"/>
+              <ma14:wrappingTextBoxFlag xmlns:ma14="http://schemas.microsoft.com/office/mac/drawingml/2011/main" xmlns="" val="1"/>
             </a:ext>
           </a:extLst>
         </p:spPr>
@@ -20753,7 +20753,7 @@
           </a:ln>
           <a:extLst>
             <a:ext uri="{C572A759-6A51-4108-AA02-DFA0A04FC94B}">
-              <ma14:wrappingTextBoxFlag xmlns="" xmlns:ma14="http://schemas.microsoft.com/office/mac/drawingml/2011/main" val="1"/>
+              <ma14:wrappingTextBoxFlag xmlns:ma14="http://schemas.microsoft.com/office/mac/drawingml/2011/main" xmlns="" val="1"/>
             </a:ext>
           </a:extLst>
         </p:spPr>
@@ -20842,7 +20842,7 @@
           </a:ln>
           <a:extLst>
             <a:ext uri="{C572A759-6A51-4108-AA02-DFA0A04FC94B}">
-              <ma14:wrappingTextBoxFlag xmlns="" xmlns:ma14="http://schemas.microsoft.com/office/mac/drawingml/2011/main" val="1"/>
+              <ma14:wrappingTextBoxFlag xmlns:ma14="http://schemas.microsoft.com/office/mac/drawingml/2011/main" xmlns="" val="1"/>
             </a:ext>
           </a:extLst>
         </p:spPr>
@@ -20931,7 +20931,7 @@
           </a:ln>
           <a:extLst>
             <a:ext uri="{C572A759-6A51-4108-AA02-DFA0A04FC94B}">
-              <ma14:wrappingTextBoxFlag xmlns="" xmlns:ma14="http://schemas.microsoft.com/office/mac/drawingml/2011/main" val="1"/>
+              <ma14:wrappingTextBoxFlag xmlns:ma14="http://schemas.microsoft.com/office/mac/drawingml/2011/main" xmlns="" val="1"/>
             </a:ext>
           </a:extLst>
         </p:spPr>
@@ -23046,7 +23046,7 @@
           </a:ln>
           <a:extLst>
             <a:ext uri="{C572A759-6A51-4108-AA02-DFA0A04FC94B}">
-              <ma14:wrappingTextBoxFlag xmlns:ma14="http://schemas.microsoft.com/office/mac/drawingml/2011/main" xmlns="" val="1"/>
+              <ma14:wrappingTextBoxFlag xmlns="" xmlns:ma14="http://schemas.microsoft.com/office/mac/drawingml/2011/main" val="1"/>
             </a:ext>
           </a:extLst>
         </p:spPr>
@@ -23143,7 +23143,7 @@
           </a:ln>
           <a:extLst>
             <a:ext uri="{C572A759-6A51-4108-AA02-DFA0A04FC94B}">
-              <ma14:wrappingTextBoxFlag xmlns:ma14="http://schemas.microsoft.com/office/mac/drawingml/2011/main" xmlns="" val="1"/>
+              <ma14:wrappingTextBoxFlag xmlns="" xmlns:ma14="http://schemas.microsoft.com/office/mac/drawingml/2011/main" val="1"/>
             </a:ext>
           </a:extLst>
         </p:spPr>
@@ -23255,7 +23255,7 @@
           </a:ln>
           <a:extLst>
             <a:ext uri="{C572A759-6A51-4108-AA02-DFA0A04FC94B}">
-              <ma14:wrappingTextBoxFlag xmlns:ma14="http://schemas.microsoft.com/office/mac/drawingml/2011/main" xmlns="" val="1"/>
+              <ma14:wrappingTextBoxFlag xmlns="" xmlns:ma14="http://schemas.microsoft.com/office/mac/drawingml/2011/main" val="1"/>
             </a:ext>
           </a:extLst>
         </p:spPr>
@@ -23799,7 +23799,7 @@
           </a:ln>
           <a:extLst>
             <a:ext uri="{C572A759-6A51-4108-AA02-DFA0A04FC94B}">
-              <ma14:wrappingTextBoxFlag xmlns:ma14="http://schemas.microsoft.com/office/mac/drawingml/2011/main" xmlns="" val="1"/>
+              <ma14:wrappingTextBoxFlag xmlns="" xmlns:ma14="http://schemas.microsoft.com/office/mac/drawingml/2011/main" val="1"/>
             </a:ext>
           </a:extLst>
         </p:spPr>
@@ -23859,7 +23859,7 @@
           </a:ln>
           <a:extLst>
             <a:ext uri="{C572A759-6A51-4108-AA02-DFA0A04FC94B}">
-              <ma14:wrappingTextBoxFlag xmlns:ma14="http://schemas.microsoft.com/office/mac/drawingml/2011/main" xmlns="" val="1"/>
+              <ma14:wrappingTextBoxFlag xmlns="" xmlns:ma14="http://schemas.microsoft.com/office/mac/drawingml/2011/main" val="1"/>
             </a:ext>
           </a:extLst>
         </p:spPr>
@@ -23919,7 +23919,7 @@
           </a:ln>
           <a:extLst>
             <a:ext uri="{C572A759-6A51-4108-AA02-DFA0A04FC94B}">
-              <ma14:wrappingTextBoxFlag xmlns:ma14="http://schemas.microsoft.com/office/mac/drawingml/2011/main" xmlns="" val="1"/>
+              <ma14:wrappingTextBoxFlag xmlns="" xmlns:ma14="http://schemas.microsoft.com/office/mac/drawingml/2011/main" val="1"/>
             </a:ext>
           </a:extLst>
         </p:spPr>
@@ -23979,7 +23979,7 @@
           </a:ln>
           <a:extLst>
             <a:ext uri="{C572A759-6A51-4108-AA02-DFA0A04FC94B}">
-              <ma14:wrappingTextBoxFlag xmlns:ma14="http://schemas.microsoft.com/office/mac/drawingml/2011/main" xmlns="" val="1"/>
+              <ma14:wrappingTextBoxFlag xmlns="" xmlns:ma14="http://schemas.microsoft.com/office/mac/drawingml/2011/main" val="1"/>
             </a:ext>
           </a:extLst>
         </p:spPr>
@@ -24039,7 +24039,7 @@
           </a:ln>
           <a:extLst>
             <a:ext uri="{C572A759-6A51-4108-AA02-DFA0A04FC94B}">
-              <ma14:wrappingTextBoxFlag xmlns:ma14="http://schemas.microsoft.com/office/mac/drawingml/2011/main" xmlns="" val="1"/>
+              <ma14:wrappingTextBoxFlag xmlns="" xmlns:ma14="http://schemas.microsoft.com/office/mac/drawingml/2011/main" val="1"/>
             </a:ext>
           </a:extLst>
         </p:spPr>
@@ -24099,7 +24099,7 @@
           </a:ln>
           <a:extLst>
             <a:ext uri="{C572A759-6A51-4108-AA02-DFA0A04FC94B}">
-              <ma14:wrappingTextBoxFlag xmlns:ma14="http://schemas.microsoft.com/office/mac/drawingml/2011/main" xmlns="" val="1"/>
+              <ma14:wrappingTextBoxFlag xmlns="" xmlns:ma14="http://schemas.microsoft.com/office/mac/drawingml/2011/main" val="1"/>
             </a:ext>
           </a:extLst>
         </p:spPr>
@@ -24159,7 +24159,7 @@
           </a:ln>
           <a:extLst>
             <a:ext uri="{C572A759-6A51-4108-AA02-DFA0A04FC94B}">
-              <ma14:wrappingTextBoxFlag xmlns:ma14="http://schemas.microsoft.com/office/mac/drawingml/2011/main" xmlns="" val="1"/>
+              <ma14:wrappingTextBoxFlag xmlns="" xmlns:ma14="http://schemas.microsoft.com/office/mac/drawingml/2011/main" val="1"/>
             </a:ext>
           </a:extLst>
         </p:spPr>
@@ -24219,7 +24219,7 @@
           </a:ln>
           <a:extLst>
             <a:ext uri="{C572A759-6A51-4108-AA02-DFA0A04FC94B}">
-              <ma14:wrappingTextBoxFlag xmlns:ma14="http://schemas.microsoft.com/office/mac/drawingml/2011/main" xmlns="" val="1"/>
+              <ma14:wrappingTextBoxFlag xmlns="" xmlns:ma14="http://schemas.microsoft.com/office/mac/drawingml/2011/main" val="1"/>
             </a:ext>
           </a:extLst>
         </p:spPr>
@@ -24273,7 +24273,7 @@
           </a:ln>
           <a:extLst>
             <a:ext uri="{C572A759-6A51-4108-AA02-DFA0A04FC94B}">
-              <ma14:wrappingTextBoxFlag xmlns:ma14="http://schemas.microsoft.com/office/mac/drawingml/2011/main" xmlns="" val="1"/>
+              <ma14:wrappingTextBoxFlag xmlns="" xmlns:ma14="http://schemas.microsoft.com/office/mac/drawingml/2011/main" val="1"/>
             </a:ext>
           </a:extLst>
         </p:spPr>
@@ -24697,7 +24697,7 @@
           </a:ln>
           <a:extLst>
             <a:ext uri="{C572A759-6A51-4108-AA02-DFA0A04FC94B}">
-              <ma14:wrappingTextBoxFlag xmlns:ma14="http://schemas.microsoft.com/office/mac/drawingml/2011/main" xmlns="" val="1"/>
+              <ma14:wrappingTextBoxFlag xmlns="" xmlns:ma14="http://schemas.microsoft.com/office/mac/drawingml/2011/main" val="1"/>
             </a:ext>
           </a:extLst>
         </p:spPr>
@@ -24757,7 +24757,7 @@
           </a:ln>
           <a:extLst>
             <a:ext uri="{C572A759-6A51-4108-AA02-DFA0A04FC94B}">
-              <ma14:wrappingTextBoxFlag xmlns:ma14="http://schemas.microsoft.com/office/mac/drawingml/2011/main" xmlns="" val="1"/>
+              <ma14:wrappingTextBoxFlag xmlns="" xmlns:ma14="http://schemas.microsoft.com/office/mac/drawingml/2011/main" val="1"/>
             </a:ext>
           </a:extLst>
         </p:spPr>
@@ -24817,7 +24817,7 @@
           </a:ln>
           <a:extLst>
             <a:ext uri="{C572A759-6A51-4108-AA02-DFA0A04FC94B}">
-              <ma14:wrappingTextBoxFlag xmlns:ma14="http://schemas.microsoft.com/office/mac/drawingml/2011/main" xmlns="" val="1"/>
+              <ma14:wrappingTextBoxFlag xmlns="" xmlns:ma14="http://schemas.microsoft.com/office/mac/drawingml/2011/main" val="1"/>
             </a:ext>
           </a:extLst>
         </p:spPr>
@@ -24877,7 +24877,7 @@
           </a:ln>
           <a:extLst>
             <a:ext uri="{C572A759-6A51-4108-AA02-DFA0A04FC94B}">
-              <ma14:wrappingTextBoxFlag xmlns:ma14="http://schemas.microsoft.com/office/mac/drawingml/2011/main" xmlns="" val="1"/>
+              <ma14:wrappingTextBoxFlag xmlns="" xmlns:ma14="http://schemas.microsoft.com/office/mac/drawingml/2011/main" val="1"/>
             </a:ext>
           </a:extLst>
         </p:spPr>
@@ -24937,7 +24937,7 @@
           </a:ln>
           <a:extLst>
             <a:ext uri="{C572A759-6A51-4108-AA02-DFA0A04FC94B}">
-              <ma14:wrappingTextBoxFlag xmlns:ma14="http://schemas.microsoft.com/office/mac/drawingml/2011/main" xmlns="" val="1"/>
+              <ma14:wrappingTextBoxFlag xmlns="" xmlns:ma14="http://schemas.microsoft.com/office/mac/drawingml/2011/main" val="1"/>
             </a:ext>
           </a:extLst>
         </p:spPr>
@@ -24997,7 +24997,7 @@
           </a:ln>
           <a:extLst>
             <a:ext uri="{C572A759-6A51-4108-AA02-DFA0A04FC94B}">
-              <ma14:wrappingTextBoxFlag xmlns:ma14="http://schemas.microsoft.com/office/mac/drawingml/2011/main" xmlns="" val="1"/>
+              <ma14:wrappingTextBoxFlag xmlns="" xmlns:ma14="http://schemas.microsoft.com/office/mac/drawingml/2011/main" val="1"/>
             </a:ext>
           </a:extLst>
         </p:spPr>
@@ -25057,7 +25057,7 @@
           </a:ln>
           <a:extLst>
             <a:ext uri="{C572A759-6A51-4108-AA02-DFA0A04FC94B}">
-              <ma14:wrappingTextBoxFlag xmlns:ma14="http://schemas.microsoft.com/office/mac/drawingml/2011/main" xmlns="" val="1"/>
+              <ma14:wrappingTextBoxFlag xmlns="" xmlns:ma14="http://schemas.microsoft.com/office/mac/drawingml/2011/main" val="1"/>
             </a:ext>
           </a:extLst>
         </p:spPr>
@@ -25117,7 +25117,7 @@
           </a:ln>
           <a:extLst>
             <a:ext uri="{C572A759-6A51-4108-AA02-DFA0A04FC94B}">
-              <ma14:wrappingTextBoxFlag xmlns:ma14="http://schemas.microsoft.com/office/mac/drawingml/2011/main" xmlns="" val="1"/>
+              <ma14:wrappingTextBoxFlag xmlns="" xmlns:ma14="http://schemas.microsoft.com/office/mac/drawingml/2011/main" val="1"/>
             </a:ext>
           </a:extLst>
         </p:spPr>
@@ -25171,7 +25171,7 @@
           </a:ln>
           <a:extLst>
             <a:ext uri="{C572A759-6A51-4108-AA02-DFA0A04FC94B}">
-              <ma14:wrappingTextBoxFlag xmlns:ma14="http://schemas.microsoft.com/office/mac/drawingml/2011/main" xmlns="" val="1"/>
+              <ma14:wrappingTextBoxFlag xmlns="" xmlns:ma14="http://schemas.microsoft.com/office/mac/drawingml/2011/main" val="1"/>
             </a:ext>
           </a:extLst>
         </p:spPr>
@@ -25728,7 +25728,7 @@
           </a:ln>
           <a:extLst>
             <a:ext uri="{C572A759-6A51-4108-AA02-DFA0A04FC94B}">
-              <ma14:wrappingTextBoxFlag xmlns:ma14="http://schemas.microsoft.com/office/mac/drawingml/2011/main" xmlns="" val="1"/>
+              <ma14:wrappingTextBoxFlag xmlns="" xmlns:ma14="http://schemas.microsoft.com/office/mac/drawingml/2011/main" val="1"/>
             </a:ext>
           </a:extLst>
         </p:spPr>
@@ -26276,7 +26276,7 @@
           </a:ln>
           <a:extLst>
             <a:ext uri="{C572A759-6A51-4108-AA02-DFA0A04FC94B}">
-              <ma14:wrappingTextBoxFlag xmlns:ma14="http://schemas.microsoft.com/office/mac/drawingml/2011/main" xmlns="" val="1"/>
+              <ma14:wrappingTextBoxFlag xmlns="" xmlns:ma14="http://schemas.microsoft.com/office/mac/drawingml/2011/main" val="1"/>
             </a:ext>
           </a:extLst>
         </p:spPr>
@@ -26370,7 +26370,7 @@
           </a:ln>
           <a:extLst>
             <a:ext uri="{C572A759-6A51-4108-AA02-DFA0A04FC94B}">
-              <ma14:wrappingTextBoxFlag xmlns:ma14="http://schemas.microsoft.com/office/mac/drawingml/2011/main" xmlns="" val="1"/>
+              <ma14:wrappingTextBoxFlag xmlns="" xmlns:ma14="http://schemas.microsoft.com/office/mac/drawingml/2011/main" val="1"/>
             </a:ext>
           </a:extLst>
         </p:spPr>
@@ -26464,7 +26464,7 @@
           </a:ln>
           <a:extLst>
             <a:ext uri="{C572A759-6A51-4108-AA02-DFA0A04FC94B}">
-              <ma14:wrappingTextBoxFlag xmlns:ma14="http://schemas.microsoft.com/office/mac/drawingml/2011/main" xmlns="" val="1"/>
+              <ma14:wrappingTextBoxFlag xmlns="" xmlns:ma14="http://schemas.microsoft.com/office/mac/drawingml/2011/main" val="1"/>
             </a:ext>
           </a:extLst>
         </p:spPr>
@@ -26558,7 +26558,7 @@
           </a:ln>
           <a:extLst>
             <a:ext uri="{C572A759-6A51-4108-AA02-DFA0A04FC94B}">
-              <ma14:wrappingTextBoxFlag xmlns:ma14="http://schemas.microsoft.com/office/mac/drawingml/2011/main" xmlns="" val="1"/>
+              <ma14:wrappingTextBoxFlag xmlns="" xmlns:ma14="http://schemas.microsoft.com/office/mac/drawingml/2011/main" val="1"/>
             </a:ext>
           </a:extLst>
         </p:spPr>
@@ -26652,7 +26652,7 @@
           </a:ln>
           <a:extLst>
             <a:ext uri="{C572A759-6A51-4108-AA02-DFA0A04FC94B}">
-              <ma14:wrappingTextBoxFlag xmlns:ma14="http://schemas.microsoft.com/office/mac/drawingml/2011/main" xmlns="" val="1"/>
+              <ma14:wrappingTextBoxFlag xmlns="" xmlns:ma14="http://schemas.microsoft.com/office/mac/drawingml/2011/main" val="1"/>
             </a:ext>
           </a:extLst>
         </p:spPr>
@@ -26749,7 +26749,7 @@
           </a:ln>
           <a:extLst>
             <a:ext uri="{C572A759-6A51-4108-AA02-DFA0A04FC94B}">
-              <ma14:wrappingTextBoxFlag xmlns:ma14="http://schemas.microsoft.com/office/mac/drawingml/2011/main" xmlns="" val="1"/>
+              <ma14:wrappingTextBoxFlag xmlns="" xmlns:ma14="http://schemas.microsoft.com/office/mac/drawingml/2011/main" val="1"/>
             </a:ext>
           </a:extLst>
         </p:spPr>
@@ -26807,7 +26807,7 @@
           </a:ln>
           <a:extLst>
             <a:ext uri="{C572A759-6A51-4108-AA02-DFA0A04FC94B}">
-              <ma14:wrappingTextBoxFlag xmlns:ma14="http://schemas.microsoft.com/office/mac/drawingml/2011/main" xmlns="" val="1"/>
+              <ma14:wrappingTextBoxFlag xmlns="" xmlns:ma14="http://schemas.microsoft.com/office/mac/drawingml/2011/main" val="1"/>
             </a:ext>
           </a:extLst>
         </p:spPr>
@@ -26924,7 +26924,7 @@
           </a:ln>
           <a:extLst>
             <a:ext uri="{C572A759-6A51-4108-AA02-DFA0A04FC94B}">
-              <ma14:wrappingTextBoxFlag xmlns:ma14="http://schemas.microsoft.com/office/mac/drawingml/2011/main" xmlns="" val="1"/>
+              <ma14:wrappingTextBoxFlag xmlns="" xmlns:ma14="http://schemas.microsoft.com/office/mac/drawingml/2011/main" val="1"/>
             </a:ext>
           </a:extLst>
         </p:spPr>
@@ -26999,7 +26999,7 @@
           </a:ln>
           <a:extLst>
             <a:ext uri="{C572A759-6A51-4108-AA02-DFA0A04FC94B}">
-              <ma14:wrappingTextBoxFlag xmlns:ma14="http://schemas.microsoft.com/office/mac/drawingml/2011/main" xmlns="" val="1"/>
+              <ma14:wrappingTextBoxFlag xmlns="" xmlns:ma14="http://schemas.microsoft.com/office/mac/drawingml/2011/main" val="1"/>
             </a:ext>
           </a:extLst>
         </p:spPr>
@@ -27074,7 +27074,7 @@
           </a:ln>
           <a:extLst>
             <a:ext uri="{C572A759-6A51-4108-AA02-DFA0A04FC94B}">
-              <ma14:wrappingTextBoxFlag xmlns:ma14="http://schemas.microsoft.com/office/mac/drawingml/2011/main" xmlns="" val="1"/>
+              <ma14:wrappingTextBoxFlag xmlns="" xmlns:ma14="http://schemas.microsoft.com/office/mac/drawingml/2011/main" val="1"/>
             </a:ext>
           </a:extLst>
         </p:spPr>
@@ -27181,7 +27181,7 @@
           </a:ln>
           <a:extLst>
             <a:ext uri="{C572A759-6A51-4108-AA02-DFA0A04FC94B}">
-              <ma14:wrappingTextBoxFlag xmlns:ma14="http://schemas.microsoft.com/office/mac/drawingml/2011/main" xmlns="" val="1"/>
+              <ma14:wrappingTextBoxFlag xmlns="" xmlns:ma14="http://schemas.microsoft.com/office/mac/drawingml/2011/main" val="1"/>
             </a:ext>
           </a:extLst>
         </p:spPr>
@@ -27256,7 +27256,7 @@
           </a:ln>
           <a:extLst>
             <a:ext uri="{C572A759-6A51-4108-AA02-DFA0A04FC94B}">
-              <ma14:wrappingTextBoxFlag xmlns:ma14="http://schemas.microsoft.com/office/mac/drawingml/2011/main" xmlns="" val="1"/>
+              <ma14:wrappingTextBoxFlag xmlns="" xmlns:ma14="http://schemas.microsoft.com/office/mac/drawingml/2011/main" val="1"/>
             </a:ext>
           </a:extLst>
         </p:spPr>
@@ -27363,7 +27363,7 @@
           </a:ln>
           <a:extLst>
             <a:ext uri="{C572A759-6A51-4108-AA02-DFA0A04FC94B}">
-              <ma14:wrappingTextBoxFlag xmlns:ma14="http://schemas.microsoft.com/office/mac/drawingml/2011/main" xmlns="" val="1"/>
+              <ma14:wrappingTextBoxFlag xmlns="" xmlns:ma14="http://schemas.microsoft.com/office/mac/drawingml/2011/main" val="1"/>
             </a:ext>
           </a:extLst>
         </p:spPr>
@@ -27438,7 +27438,7 @@
           </a:ln>
           <a:extLst>
             <a:ext uri="{C572A759-6A51-4108-AA02-DFA0A04FC94B}">
-              <ma14:wrappingTextBoxFlag xmlns:ma14="http://schemas.microsoft.com/office/mac/drawingml/2011/main" xmlns="" val="1"/>
+              <ma14:wrappingTextBoxFlag xmlns="" xmlns:ma14="http://schemas.microsoft.com/office/mac/drawingml/2011/main" val="1"/>
             </a:ext>
           </a:extLst>
         </p:spPr>
@@ -27545,7 +27545,7 @@
           </a:ln>
           <a:extLst>
             <a:ext uri="{C572A759-6A51-4108-AA02-DFA0A04FC94B}">
-              <ma14:wrappingTextBoxFlag xmlns:ma14="http://schemas.microsoft.com/office/mac/drawingml/2011/main" xmlns="" val="1"/>
+              <ma14:wrappingTextBoxFlag xmlns="" xmlns:ma14="http://schemas.microsoft.com/office/mac/drawingml/2011/main" val="1"/>
             </a:ext>
           </a:extLst>
         </p:spPr>
@@ -27620,7 +27620,7 @@
           </a:ln>
           <a:extLst>
             <a:ext uri="{C572A759-6A51-4108-AA02-DFA0A04FC94B}">
-              <ma14:wrappingTextBoxFlag xmlns:ma14="http://schemas.microsoft.com/office/mac/drawingml/2011/main" xmlns="" val="1"/>
+              <ma14:wrappingTextBoxFlag xmlns="" xmlns:ma14="http://schemas.microsoft.com/office/mac/drawingml/2011/main" val="1"/>
             </a:ext>
           </a:extLst>
         </p:spPr>
@@ -27667,7 +27667,7 @@
           </a:ln>
           <a:extLst>
             <a:ext uri="{C572A759-6A51-4108-AA02-DFA0A04FC94B}">
-              <ma14:wrappingTextBoxFlag xmlns:ma14="http://schemas.microsoft.com/office/mac/drawingml/2011/main" xmlns="" val="1"/>
+              <ma14:wrappingTextBoxFlag xmlns="" xmlns:ma14="http://schemas.microsoft.com/office/mac/drawingml/2011/main" val="1"/>
             </a:ext>
           </a:extLst>
         </p:spPr>
@@ -27725,7 +27725,7 @@
           </a:ln>
           <a:extLst>
             <a:ext uri="{C572A759-6A51-4108-AA02-DFA0A04FC94B}">
-              <ma14:wrappingTextBoxFlag xmlns:ma14="http://schemas.microsoft.com/office/mac/drawingml/2011/main" xmlns="" val="1"/>
+              <ma14:wrappingTextBoxFlag xmlns="" xmlns:ma14="http://schemas.microsoft.com/office/mac/drawingml/2011/main" val="1"/>
             </a:ext>
           </a:extLst>
         </p:spPr>
@@ -27782,7 +27782,7 @@
           </a:ln>
           <a:extLst>
             <a:ext uri="{C572A759-6A51-4108-AA02-DFA0A04FC94B}">
-              <ma14:wrappingTextBoxFlag xmlns:ma14="http://schemas.microsoft.com/office/mac/drawingml/2011/main" xmlns="" val="1"/>
+              <ma14:wrappingTextBoxFlag xmlns="" xmlns:ma14="http://schemas.microsoft.com/office/mac/drawingml/2011/main" val="1"/>
             </a:ext>
           </a:extLst>
         </p:spPr>
@@ -27840,7 +27840,7 @@
           </a:ln>
           <a:extLst>
             <a:ext uri="{C572A759-6A51-4108-AA02-DFA0A04FC94B}">
-              <ma14:wrappingTextBoxFlag xmlns:ma14="http://schemas.microsoft.com/office/mac/drawingml/2011/main" xmlns="" val="1"/>
+              <ma14:wrappingTextBoxFlag xmlns="" xmlns:ma14="http://schemas.microsoft.com/office/mac/drawingml/2011/main" val="1"/>
             </a:ext>
           </a:extLst>
         </p:spPr>
@@ -27897,7 +27897,7 @@
           </a:ln>
           <a:extLst>
             <a:ext uri="{C572A759-6A51-4108-AA02-DFA0A04FC94B}">
-              <ma14:wrappingTextBoxFlag xmlns:ma14="http://schemas.microsoft.com/office/mac/drawingml/2011/main" xmlns="" val="1"/>
+              <ma14:wrappingTextBoxFlag xmlns="" xmlns:ma14="http://schemas.microsoft.com/office/mac/drawingml/2011/main" val="1"/>
             </a:ext>
           </a:extLst>
         </p:spPr>
@@ -27955,7 +27955,7 @@
           </a:ln>
           <a:extLst>
             <a:ext uri="{C572A759-6A51-4108-AA02-DFA0A04FC94B}">
-              <ma14:wrappingTextBoxFlag xmlns:ma14="http://schemas.microsoft.com/office/mac/drawingml/2011/main" xmlns="" val="1"/>
+              <ma14:wrappingTextBoxFlag xmlns="" xmlns:ma14="http://schemas.microsoft.com/office/mac/drawingml/2011/main" val="1"/>
             </a:ext>
           </a:extLst>
         </p:spPr>
@@ -28008,7 +28008,7 @@
           </a:ln>
           <a:extLst>
             <a:ext uri="{C572A759-6A51-4108-AA02-DFA0A04FC94B}">
-              <ma14:wrappingTextBoxFlag xmlns:ma14="http://schemas.microsoft.com/office/mac/drawingml/2011/main" xmlns="" val="1"/>
+              <ma14:wrappingTextBoxFlag xmlns="" xmlns:ma14="http://schemas.microsoft.com/office/mac/drawingml/2011/main" val="1"/>
             </a:ext>
           </a:extLst>
         </p:spPr>
@@ -28100,7 +28100,7 @@
           </a:ln>
           <a:extLst>
             <a:ext uri="{C572A759-6A51-4108-AA02-DFA0A04FC94B}">
-              <ma14:wrappingTextBoxFlag xmlns:ma14="http://schemas.microsoft.com/office/mac/drawingml/2011/main" xmlns="" val="1"/>
+              <ma14:wrappingTextBoxFlag xmlns="" xmlns:ma14="http://schemas.microsoft.com/office/mac/drawingml/2011/main" val="1"/>
             </a:ext>
           </a:extLst>
         </p:spPr>
@@ -28192,7 +28192,7 @@
           </a:ln>
           <a:extLst>
             <a:ext uri="{C572A759-6A51-4108-AA02-DFA0A04FC94B}">
-              <ma14:wrappingTextBoxFlag xmlns:ma14="http://schemas.microsoft.com/office/mac/drawingml/2011/main" xmlns="" val="1"/>
+              <ma14:wrappingTextBoxFlag xmlns="" xmlns:ma14="http://schemas.microsoft.com/office/mac/drawingml/2011/main" val="1"/>
             </a:ext>
           </a:extLst>
         </p:spPr>
@@ -28284,7 +28284,7 @@
           </a:ln>
           <a:extLst>
             <a:ext uri="{C572A759-6A51-4108-AA02-DFA0A04FC94B}">
-              <ma14:wrappingTextBoxFlag xmlns:ma14="http://schemas.microsoft.com/office/mac/drawingml/2011/main" xmlns="" val="1"/>
+              <ma14:wrappingTextBoxFlag xmlns="" xmlns:ma14="http://schemas.microsoft.com/office/mac/drawingml/2011/main" val="1"/>
             </a:ext>
           </a:extLst>
         </p:spPr>
@@ -28406,7 +28406,7 @@
           </a:ln>
           <a:extLst>
             <a:ext uri="{C572A759-6A51-4108-AA02-DFA0A04FC94B}">
-              <ma14:wrappingTextBoxFlag xmlns:ma14="http://schemas.microsoft.com/office/mac/drawingml/2011/main" xmlns="" val="1"/>
+              <ma14:wrappingTextBoxFlag xmlns="" xmlns:ma14="http://schemas.microsoft.com/office/mac/drawingml/2011/main" val="1"/>
             </a:ext>
           </a:extLst>
         </p:spPr>
@@ -28857,7 +28857,7 @@
           </a:ln>
           <a:extLst>
             <a:ext uri="{C572A759-6A51-4108-AA02-DFA0A04FC94B}">
-              <ma14:wrappingTextBoxFlag xmlns:ma14="http://schemas.microsoft.com/office/mac/drawingml/2011/main" xmlns="" val="1"/>
+              <ma14:wrappingTextBoxFlag xmlns="" xmlns:ma14="http://schemas.microsoft.com/office/mac/drawingml/2011/main" val="1"/>
             </a:ext>
           </a:extLst>
         </p:spPr>
@@ -29436,7 +29436,7 @@
           </a:ln>
           <a:extLst>
             <a:ext uri="{C572A759-6A51-4108-AA02-DFA0A04FC94B}">
-              <ma14:wrappingTextBoxFlag xmlns:ma14="http://schemas.microsoft.com/office/mac/drawingml/2011/main" xmlns="" val="1"/>
+              <ma14:wrappingTextBoxFlag xmlns="" xmlns:ma14="http://schemas.microsoft.com/office/mac/drawingml/2011/main" val="1"/>
             </a:ext>
           </a:extLst>
         </p:spPr>
@@ -29530,7 +29530,7 @@
           </a:ln>
           <a:extLst>
             <a:ext uri="{C572A759-6A51-4108-AA02-DFA0A04FC94B}">
-              <ma14:wrappingTextBoxFlag xmlns:ma14="http://schemas.microsoft.com/office/mac/drawingml/2011/main" xmlns="" val="1"/>
+              <ma14:wrappingTextBoxFlag xmlns="" xmlns:ma14="http://schemas.microsoft.com/office/mac/drawingml/2011/main" val="1"/>
             </a:ext>
           </a:extLst>
         </p:spPr>
@@ -29624,7 +29624,7 @@
           </a:ln>
           <a:extLst>
             <a:ext uri="{C572A759-6A51-4108-AA02-DFA0A04FC94B}">
-              <ma14:wrappingTextBoxFlag xmlns:ma14="http://schemas.microsoft.com/office/mac/drawingml/2011/main" xmlns="" val="1"/>
+              <ma14:wrappingTextBoxFlag xmlns="" xmlns:ma14="http://schemas.microsoft.com/office/mac/drawingml/2011/main" val="1"/>
             </a:ext>
           </a:extLst>
         </p:spPr>
@@ -29718,7 +29718,7 @@
           </a:ln>
           <a:extLst>
             <a:ext uri="{C572A759-6A51-4108-AA02-DFA0A04FC94B}">
-              <ma14:wrappingTextBoxFlag xmlns:ma14="http://schemas.microsoft.com/office/mac/drawingml/2011/main" xmlns="" val="1"/>
+              <ma14:wrappingTextBoxFlag xmlns="" xmlns:ma14="http://schemas.microsoft.com/office/mac/drawingml/2011/main" val="1"/>
             </a:ext>
           </a:extLst>
         </p:spPr>
@@ -29812,7 +29812,7 @@
           </a:ln>
           <a:extLst>
             <a:ext uri="{C572A759-6A51-4108-AA02-DFA0A04FC94B}">
-              <ma14:wrappingTextBoxFlag xmlns:ma14="http://schemas.microsoft.com/office/mac/drawingml/2011/main" xmlns="" val="1"/>
+              <ma14:wrappingTextBoxFlag xmlns="" xmlns:ma14="http://schemas.microsoft.com/office/mac/drawingml/2011/main" val="1"/>
             </a:ext>
           </a:extLst>
         </p:spPr>
@@ -29871,7 +29871,7 @@
           </a:ln>
           <a:extLst>
             <a:ext uri="{C572A759-6A51-4108-AA02-DFA0A04FC94B}">
-              <ma14:wrappingTextBoxFlag xmlns:ma14="http://schemas.microsoft.com/office/mac/drawingml/2011/main" xmlns="" val="1"/>
+              <ma14:wrappingTextBoxFlag xmlns="" xmlns:ma14="http://schemas.microsoft.com/office/mac/drawingml/2011/main" val="1"/>
             </a:ext>
           </a:extLst>
         </p:spPr>
@@ -29929,7 +29929,7 @@
           </a:ln>
           <a:extLst>
             <a:ext uri="{C572A759-6A51-4108-AA02-DFA0A04FC94B}">
-              <ma14:wrappingTextBoxFlag xmlns:ma14="http://schemas.microsoft.com/office/mac/drawingml/2011/main" xmlns="" val="1"/>
+              <ma14:wrappingTextBoxFlag xmlns="" xmlns:ma14="http://schemas.microsoft.com/office/mac/drawingml/2011/main" val="1"/>
             </a:ext>
           </a:extLst>
         </p:spPr>
@@ -30046,7 +30046,7 @@
           </a:ln>
           <a:extLst>
             <a:ext uri="{C572A759-6A51-4108-AA02-DFA0A04FC94B}">
-              <ma14:wrappingTextBoxFlag xmlns:ma14="http://schemas.microsoft.com/office/mac/drawingml/2011/main" xmlns="" val="1"/>
+              <ma14:wrappingTextBoxFlag xmlns="" xmlns:ma14="http://schemas.microsoft.com/office/mac/drawingml/2011/main" val="1"/>
             </a:ext>
           </a:extLst>
         </p:spPr>
@@ -30121,7 +30121,7 @@
           </a:ln>
           <a:extLst>
             <a:ext uri="{C572A759-6A51-4108-AA02-DFA0A04FC94B}">
-              <ma14:wrappingTextBoxFlag xmlns:ma14="http://schemas.microsoft.com/office/mac/drawingml/2011/main" xmlns="" val="1"/>
+              <ma14:wrappingTextBoxFlag xmlns="" xmlns:ma14="http://schemas.microsoft.com/office/mac/drawingml/2011/main" val="1"/>
             </a:ext>
           </a:extLst>
         </p:spPr>
@@ -30196,7 +30196,7 @@
           </a:ln>
           <a:extLst>
             <a:ext uri="{C572A759-6A51-4108-AA02-DFA0A04FC94B}">
-              <ma14:wrappingTextBoxFlag xmlns:ma14="http://schemas.microsoft.com/office/mac/drawingml/2011/main" xmlns="" val="1"/>
+              <ma14:wrappingTextBoxFlag xmlns="" xmlns:ma14="http://schemas.microsoft.com/office/mac/drawingml/2011/main" val="1"/>
             </a:ext>
           </a:extLst>
         </p:spPr>
@@ -30303,7 +30303,7 @@
           </a:ln>
           <a:extLst>
             <a:ext uri="{C572A759-6A51-4108-AA02-DFA0A04FC94B}">
-              <ma14:wrappingTextBoxFlag xmlns:ma14="http://schemas.microsoft.com/office/mac/drawingml/2011/main" xmlns="" val="1"/>
+              <ma14:wrappingTextBoxFlag xmlns="" xmlns:ma14="http://schemas.microsoft.com/office/mac/drawingml/2011/main" val="1"/>
             </a:ext>
           </a:extLst>
         </p:spPr>
@@ -30378,7 +30378,7 @@
           </a:ln>
           <a:extLst>
             <a:ext uri="{C572A759-6A51-4108-AA02-DFA0A04FC94B}">
-              <ma14:wrappingTextBoxFlag xmlns:ma14="http://schemas.microsoft.com/office/mac/drawingml/2011/main" xmlns="" val="1"/>
+              <ma14:wrappingTextBoxFlag xmlns="" xmlns:ma14="http://schemas.microsoft.com/office/mac/drawingml/2011/main" val="1"/>
             </a:ext>
           </a:extLst>
         </p:spPr>
@@ -30485,7 +30485,7 @@
           </a:ln>
           <a:extLst>
             <a:ext uri="{C572A759-6A51-4108-AA02-DFA0A04FC94B}">
-              <ma14:wrappingTextBoxFlag xmlns:ma14="http://schemas.microsoft.com/office/mac/drawingml/2011/main" xmlns="" val="1"/>
+              <ma14:wrappingTextBoxFlag xmlns="" xmlns:ma14="http://schemas.microsoft.com/office/mac/drawingml/2011/main" val="1"/>
             </a:ext>
           </a:extLst>
         </p:spPr>
@@ -30560,7 +30560,7 @@
           </a:ln>
           <a:extLst>
             <a:ext uri="{C572A759-6A51-4108-AA02-DFA0A04FC94B}">
-              <ma14:wrappingTextBoxFlag xmlns:ma14="http://schemas.microsoft.com/office/mac/drawingml/2011/main" xmlns="" val="1"/>
+              <ma14:wrappingTextBoxFlag xmlns="" xmlns:ma14="http://schemas.microsoft.com/office/mac/drawingml/2011/main" val="1"/>
             </a:ext>
           </a:extLst>
         </p:spPr>
@@ -30667,7 +30667,7 @@
           </a:ln>
           <a:extLst>
             <a:ext uri="{C572A759-6A51-4108-AA02-DFA0A04FC94B}">
-              <ma14:wrappingTextBoxFlag xmlns:ma14="http://schemas.microsoft.com/office/mac/drawingml/2011/main" xmlns="" val="1"/>
+              <ma14:wrappingTextBoxFlag xmlns="" xmlns:ma14="http://schemas.microsoft.com/office/mac/drawingml/2011/main" val="1"/>
             </a:ext>
           </a:extLst>
         </p:spPr>
@@ -30742,7 +30742,7 @@
           </a:ln>
           <a:extLst>
             <a:ext uri="{C572A759-6A51-4108-AA02-DFA0A04FC94B}">
-              <ma14:wrappingTextBoxFlag xmlns:ma14="http://schemas.microsoft.com/office/mac/drawingml/2011/main" xmlns="" val="1"/>
+              <ma14:wrappingTextBoxFlag xmlns="" xmlns:ma14="http://schemas.microsoft.com/office/mac/drawingml/2011/main" val="1"/>
             </a:ext>
           </a:extLst>
         </p:spPr>
@@ -30789,7 +30789,7 @@
           </a:ln>
           <a:extLst>
             <a:ext uri="{C572A759-6A51-4108-AA02-DFA0A04FC94B}">
-              <ma14:wrappingTextBoxFlag xmlns:ma14="http://schemas.microsoft.com/office/mac/drawingml/2011/main" xmlns="" val="1"/>
+              <ma14:wrappingTextBoxFlag xmlns="" xmlns:ma14="http://schemas.microsoft.com/office/mac/drawingml/2011/main" val="1"/>
             </a:ext>
           </a:extLst>
         </p:spPr>
@@ -30847,7 +30847,7 @@
           </a:ln>
           <a:extLst>
             <a:ext uri="{C572A759-6A51-4108-AA02-DFA0A04FC94B}">
-              <ma14:wrappingTextBoxFlag xmlns:ma14="http://schemas.microsoft.com/office/mac/drawingml/2011/main" xmlns="" val="1"/>
+              <ma14:wrappingTextBoxFlag xmlns="" xmlns:ma14="http://schemas.microsoft.com/office/mac/drawingml/2011/main" val="1"/>
             </a:ext>
           </a:extLst>
         </p:spPr>
@@ -30904,7 +30904,7 @@
           </a:ln>
           <a:extLst>
             <a:ext uri="{C572A759-6A51-4108-AA02-DFA0A04FC94B}">
-              <ma14:wrappingTextBoxFlag xmlns:ma14="http://schemas.microsoft.com/office/mac/drawingml/2011/main" xmlns="" val="1"/>
+              <ma14:wrappingTextBoxFlag xmlns="" xmlns:ma14="http://schemas.microsoft.com/office/mac/drawingml/2011/main" val="1"/>
             </a:ext>
           </a:extLst>
         </p:spPr>
@@ -30962,7 +30962,7 @@
           </a:ln>
           <a:extLst>
             <a:ext uri="{C572A759-6A51-4108-AA02-DFA0A04FC94B}">
-              <ma14:wrappingTextBoxFlag xmlns:ma14="http://schemas.microsoft.com/office/mac/drawingml/2011/main" xmlns="" val="1"/>
+              <ma14:wrappingTextBoxFlag xmlns="" xmlns:ma14="http://schemas.microsoft.com/office/mac/drawingml/2011/main" val="1"/>
             </a:ext>
           </a:extLst>
         </p:spPr>
@@ -31019,7 +31019,7 @@
           </a:ln>
           <a:extLst>
             <a:ext uri="{C572A759-6A51-4108-AA02-DFA0A04FC94B}">
-              <ma14:wrappingTextBoxFlag xmlns:ma14="http://schemas.microsoft.com/office/mac/drawingml/2011/main" xmlns="" val="1"/>
+              <ma14:wrappingTextBoxFlag xmlns="" xmlns:ma14="http://schemas.microsoft.com/office/mac/drawingml/2011/main" val="1"/>
             </a:ext>
           </a:extLst>
         </p:spPr>
@@ -31077,7 +31077,7 @@
           </a:ln>
           <a:extLst>
             <a:ext uri="{C572A759-6A51-4108-AA02-DFA0A04FC94B}">
-              <ma14:wrappingTextBoxFlag xmlns:ma14="http://schemas.microsoft.com/office/mac/drawingml/2011/main" xmlns="" val="1"/>
+              <ma14:wrappingTextBoxFlag xmlns="" xmlns:ma14="http://schemas.microsoft.com/office/mac/drawingml/2011/main" val="1"/>
             </a:ext>
           </a:extLst>
         </p:spPr>
@@ -31130,7 +31130,7 @@
           </a:ln>
           <a:extLst>
             <a:ext uri="{C572A759-6A51-4108-AA02-DFA0A04FC94B}">
-              <ma14:wrappingTextBoxFlag xmlns:ma14="http://schemas.microsoft.com/office/mac/drawingml/2011/main" xmlns="" val="1"/>
+              <ma14:wrappingTextBoxFlag xmlns="" xmlns:ma14="http://schemas.microsoft.com/office/mac/drawingml/2011/main" val="1"/>
             </a:ext>
           </a:extLst>
         </p:spPr>
@@ -31222,7 +31222,7 @@
           </a:ln>
           <a:extLst>
             <a:ext uri="{C572A759-6A51-4108-AA02-DFA0A04FC94B}">
-              <ma14:wrappingTextBoxFlag xmlns:ma14="http://schemas.microsoft.com/office/mac/drawingml/2011/main" xmlns="" val="1"/>
+              <ma14:wrappingTextBoxFlag xmlns="" xmlns:ma14="http://schemas.microsoft.com/office/mac/drawingml/2011/main" val="1"/>
             </a:ext>
           </a:extLst>
         </p:spPr>
@@ -31314,7 +31314,7 @@
           </a:ln>
           <a:extLst>
             <a:ext uri="{C572A759-6A51-4108-AA02-DFA0A04FC94B}">
-              <ma14:wrappingTextBoxFlag xmlns:ma14="http://schemas.microsoft.com/office/mac/drawingml/2011/main" xmlns="" val="1"/>
+              <ma14:wrappingTextBoxFlag xmlns="" xmlns:ma14="http://schemas.microsoft.com/office/mac/drawingml/2011/main" val="1"/>
             </a:ext>
           </a:extLst>
         </p:spPr>
@@ -31410,7 +31410,7 @@
           </a:ln>
           <a:extLst>
             <a:ext uri="{C572A759-6A51-4108-AA02-DFA0A04FC94B}">
-              <ma14:wrappingTextBoxFlag xmlns:ma14="http://schemas.microsoft.com/office/mac/drawingml/2011/main" xmlns="" val="1"/>
+              <ma14:wrappingTextBoxFlag xmlns="" xmlns:ma14="http://schemas.microsoft.com/office/mac/drawingml/2011/main" val="1"/>
             </a:ext>
           </a:extLst>
         </p:spPr>
@@ -31573,7 +31573,7 @@
           </a:ln>
           <a:extLst>
             <a:ext uri="{C572A759-6A51-4108-AA02-DFA0A04FC94B}">
-              <ma14:wrappingTextBoxFlag xmlns:ma14="http://schemas.microsoft.com/office/mac/drawingml/2011/main" xmlns="" val="1"/>
+              <ma14:wrappingTextBoxFlag xmlns="" xmlns:ma14="http://schemas.microsoft.com/office/mac/drawingml/2011/main" val="1"/>
             </a:ext>
           </a:extLst>
         </p:spPr>
@@ -31648,7 +31648,7 @@
           </a:ln>
           <a:extLst>
             <a:ext uri="{C572A759-6A51-4108-AA02-DFA0A04FC94B}">
-              <ma14:wrappingTextBoxFlag xmlns:ma14="http://schemas.microsoft.com/office/mac/drawingml/2011/main" xmlns="" val="1"/>
+              <ma14:wrappingTextBoxFlag xmlns="" xmlns:ma14="http://schemas.microsoft.com/office/mac/drawingml/2011/main" val="1"/>
             </a:ext>
           </a:extLst>
         </p:spPr>
@@ -31723,7 +31723,7 @@
           </a:ln>
           <a:extLst>
             <a:ext uri="{C572A759-6A51-4108-AA02-DFA0A04FC94B}">
-              <ma14:wrappingTextBoxFlag xmlns:ma14="http://schemas.microsoft.com/office/mac/drawingml/2011/main" xmlns="" val="1"/>
+              <ma14:wrappingTextBoxFlag xmlns="" xmlns:ma14="http://schemas.microsoft.com/office/mac/drawingml/2011/main" val="1"/>
             </a:ext>
           </a:extLst>
         </p:spPr>
@@ -31830,7 +31830,7 @@
           </a:ln>
           <a:extLst>
             <a:ext uri="{C572A759-6A51-4108-AA02-DFA0A04FC94B}">
-              <ma14:wrappingTextBoxFlag xmlns:ma14="http://schemas.microsoft.com/office/mac/drawingml/2011/main" xmlns="" val="1"/>
+              <ma14:wrappingTextBoxFlag xmlns="" xmlns:ma14="http://schemas.microsoft.com/office/mac/drawingml/2011/main" val="1"/>
             </a:ext>
           </a:extLst>
         </p:spPr>
@@ -31905,7 +31905,7 @@
           </a:ln>
           <a:extLst>
             <a:ext uri="{C572A759-6A51-4108-AA02-DFA0A04FC94B}">
-              <ma14:wrappingTextBoxFlag xmlns:ma14="http://schemas.microsoft.com/office/mac/drawingml/2011/main" xmlns="" val="1"/>
+              <ma14:wrappingTextBoxFlag xmlns="" xmlns:ma14="http://schemas.microsoft.com/office/mac/drawingml/2011/main" val="1"/>
             </a:ext>
           </a:extLst>
         </p:spPr>
@@ -32012,7 +32012,7 @@
           </a:ln>
           <a:extLst>
             <a:ext uri="{C572A759-6A51-4108-AA02-DFA0A04FC94B}">
-              <ma14:wrappingTextBoxFlag xmlns:ma14="http://schemas.microsoft.com/office/mac/drawingml/2011/main" xmlns="" val="1"/>
+              <ma14:wrappingTextBoxFlag xmlns="" xmlns:ma14="http://schemas.microsoft.com/office/mac/drawingml/2011/main" val="1"/>
             </a:ext>
           </a:extLst>
         </p:spPr>
@@ -32087,7 +32087,7 @@
           </a:ln>
           <a:extLst>
             <a:ext uri="{C572A759-6A51-4108-AA02-DFA0A04FC94B}">
-              <ma14:wrappingTextBoxFlag xmlns:ma14="http://schemas.microsoft.com/office/mac/drawingml/2011/main" xmlns="" val="1"/>
+              <ma14:wrappingTextBoxFlag xmlns="" xmlns:ma14="http://schemas.microsoft.com/office/mac/drawingml/2011/main" val="1"/>
             </a:ext>
           </a:extLst>
         </p:spPr>
@@ -32194,7 +32194,7 @@
           </a:ln>
           <a:extLst>
             <a:ext uri="{C572A759-6A51-4108-AA02-DFA0A04FC94B}">
-              <ma14:wrappingTextBoxFlag xmlns:ma14="http://schemas.microsoft.com/office/mac/drawingml/2011/main" xmlns="" val="1"/>
+              <ma14:wrappingTextBoxFlag xmlns="" xmlns:ma14="http://schemas.microsoft.com/office/mac/drawingml/2011/main" val="1"/>
             </a:ext>
           </a:extLst>
         </p:spPr>
@@ -32269,7 +32269,7 @@
           </a:ln>
           <a:extLst>
             <a:ext uri="{C572A759-6A51-4108-AA02-DFA0A04FC94B}">
-              <ma14:wrappingTextBoxFlag xmlns:ma14="http://schemas.microsoft.com/office/mac/drawingml/2011/main" xmlns="" val="1"/>
+              <ma14:wrappingTextBoxFlag xmlns="" xmlns:ma14="http://schemas.microsoft.com/office/mac/drawingml/2011/main" val="1"/>
             </a:ext>
           </a:extLst>
         </p:spPr>
@@ -32403,7 +32403,7 @@
           </a:ln>
           <a:extLst>
             <a:ext uri="{C572A759-6A51-4108-AA02-DFA0A04FC94B}">
-              <ma14:wrappingTextBoxFlag xmlns:ma14="http://schemas.microsoft.com/office/mac/drawingml/2011/main" xmlns="" val="1"/>
+              <ma14:wrappingTextBoxFlag xmlns="" xmlns:ma14="http://schemas.microsoft.com/office/mac/drawingml/2011/main" val="1"/>
             </a:ext>
           </a:extLst>
         </p:spPr>
@@ -32461,7 +32461,7 @@
           </a:ln>
           <a:extLst>
             <a:ext uri="{C572A759-6A51-4108-AA02-DFA0A04FC94B}">
-              <ma14:wrappingTextBoxFlag xmlns:ma14="http://schemas.microsoft.com/office/mac/drawingml/2011/main" xmlns="" val="1"/>
+              <ma14:wrappingTextBoxFlag xmlns="" xmlns:ma14="http://schemas.microsoft.com/office/mac/drawingml/2011/main" val="1"/>
             </a:ext>
           </a:extLst>
         </p:spPr>
@@ -32601,7 +32601,7 @@
           </a:ln>
           <a:extLst>
             <a:ext uri="{C572A759-6A51-4108-AA02-DFA0A04FC94B}">
-              <ma14:wrappingTextBoxFlag xmlns:ma14="http://schemas.microsoft.com/office/mac/drawingml/2011/main" xmlns="" val="1"/>
+              <ma14:wrappingTextBoxFlag xmlns="" xmlns:ma14="http://schemas.microsoft.com/office/mac/drawingml/2011/main" val="1"/>
             </a:ext>
           </a:extLst>
         </p:spPr>
@@ -32693,7 +32693,7 @@
           </a:ln>
           <a:extLst>
             <a:ext uri="{C572A759-6A51-4108-AA02-DFA0A04FC94B}">
-              <ma14:wrappingTextBoxFlag xmlns:ma14="http://schemas.microsoft.com/office/mac/drawingml/2011/main" xmlns="" val="1"/>
+              <ma14:wrappingTextBoxFlag xmlns="" xmlns:ma14="http://schemas.microsoft.com/office/mac/drawingml/2011/main" val="1"/>
             </a:ext>
           </a:extLst>
         </p:spPr>
@@ -32785,7 +32785,7 @@
           </a:ln>
           <a:extLst>
             <a:ext uri="{C572A759-6A51-4108-AA02-DFA0A04FC94B}">
-              <ma14:wrappingTextBoxFlag xmlns:ma14="http://schemas.microsoft.com/office/mac/drawingml/2011/main" xmlns="" val="1"/>
+              <ma14:wrappingTextBoxFlag xmlns="" xmlns:ma14="http://schemas.microsoft.com/office/mac/drawingml/2011/main" val="1"/>
             </a:ext>
           </a:extLst>
         </p:spPr>
@@ -32877,7 +32877,7 @@
           </a:ln>
           <a:extLst>
             <a:ext uri="{C572A759-6A51-4108-AA02-DFA0A04FC94B}">
-              <ma14:wrappingTextBoxFlag xmlns:ma14="http://schemas.microsoft.com/office/mac/drawingml/2011/main" xmlns="" val="1"/>
+              <ma14:wrappingTextBoxFlag xmlns="" xmlns:ma14="http://schemas.microsoft.com/office/mac/drawingml/2011/main" val="1"/>
             </a:ext>
           </a:extLst>
         </p:spPr>
@@ -32932,7 +32932,7 @@
           </a:ln>
           <a:extLst>
             <a:ext uri="{C572A759-6A51-4108-AA02-DFA0A04FC94B}">
-              <ma14:wrappingTextBoxFlag xmlns:ma14="http://schemas.microsoft.com/office/mac/drawingml/2011/main" xmlns="" val="1"/>
+              <ma14:wrappingTextBoxFlag xmlns="" xmlns:ma14="http://schemas.microsoft.com/office/mac/drawingml/2011/main" val="1"/>
             </a:ext>
           </a:extLst>
         </p:spPr>
@@ -35985,7 +35985,7 @@
           </a:ln>
           <a:extLst>
             <a:ext uri="{C572A759-6A51-4108-AA02-DFA0A04FC94B}">
-              <ma14:wrappingTextBoxFlag xmlns:ma14="http://schemas.microsoft.com/office/mac/drawingml/2011/main" xmlns="" val="1"/>
+              <ma14:wrappingTextBoxFlag xmlns="" xmlns:ma14="http://schemas.microsoft.com/office/mac/drawingml/2011/main" val="1"/>
             </a:ext>
           </a:extLst>
         </p:spPr>
@@ -36082,7 +36082,7 @@
           </a:ln>
           <a:extLst>
             <a:ext uri="{C572A759-6A51-4108-AA02-DFA0A04FC94B}">
-              <ma14:wrappingTextBoxFlag xmlns:ma14="http://schemas.microsoft.com/office/mac/drawingml/2011/main" xmlns="" val="1"/>
+              <ma14:wrappingTextBoxFlag xmlns="" xmlns:ma14="http://schemas.microsoft.com/office/mac/drawingml/2011/main" val="1"/>
             </a:ext>
           </a:extLst>
         </p:spPr>
@@ -36194,7 +36194,7 @@
           </a:ln>
           <a:extLst>
             <a:ext uri="{C572A759-6A51-4108-AA02-DFA0A04FC94B}">
-              <ma14:wrappingTextBoxFlag xmlns:ma14="http://schemas.microsoft.com/office/mac/drawingml/2011/main" xmlns="" val="1"/>
+              <ma14:wrappingTextBoxFlag xmlns="" xmlns:ma14="http://schemas.microsoft.com/office/mac/drawingml/2011/main" val="1"/>
             </a:ext>
           </a:extLst>
         </p:spPr>
@@ -36302,7 +36302,7 @@
           </a:ln>
           <a:extLst>
             <a:ext uri="{C572A759-6A51-4108-AA02-DFA0A04FC94B}">
-              <ma14:wrappingTextBoxFlag xmlns:ma14="http://schemas.microsoft.com/office/mac/drawingml/2011/main" xmlns="" val="1"/>
+              <ma14:wrappingTextBoxFlag xmlns="" xmlns:ma14="http://schemas.microsoft.com/office/mac/drawingml/2011/main" val="1"/>
             </a:ext>
           </a:extLst>
         </p:spPr>
@@ -37078,7 +37078,7 @@
           </a:ln>
           <a:extLst>
             <a:ext uri="{C572A759-6A51-4108-AA02-DFA0A04FC94B}">
-              <ma14:wrappingTextBoxFlag xmlns:ma14="http://schemas.microsoft.com/office/mac/drawingml/2011/main" xmlns="" val="1"/>
+              <ma14:wrappingTextBoxFlag xmlns="" xmlns:ma14="http://schemas.microsoft.com/office/mac/drawingml/2011/main" val="1"/>
             </a:ext>
           </a:extLst>
         </p:spPr>
@@ -37240,7 +37240,7 @@
           </a:ln>
           <a:extLst>
             <a:ext uri="{C572A759-6A51-4108-AA02-DFA0A04FC94B}">
-              <ma14:wrappingTextBoxFlag xmlns:ma14="http://schemas.microsoft.com/office/mac/drawingml/2011/main" xmlns="" val="1"/>
+              <ma14:wrappingTextBoxFlag xmlns="" xmlns:ma14="http://schemas.microsoft.com/office/mac/drawingml/2011/main" val="1"/>
             </a:ext>
           </a:extLst>
         </p:spPr>
@@ -38205,7 +38205,7 @@
           </a:ln>
           <a:extLst>
             <a:ext uri="{C572A759-6A51-4108-AA02-DFA0A04FC94B}">
-              <ma14:wrappingTextBoxFlag xmlns="" xmlns:ma14="http://schemas.microsoft.com/office/mac/drawingml/2011/main" val="1"/>
+              <ma14:wrappingTextBoxFlag xmlns:ma14="http://schemas.microsoft.com/office/mac/drawingml/2011/main" xmlns="" val="1"/>
             </a:ext>
           </a:extLst>
         </p:spPr>
@@ -38280,7 +38280,15 @@
             </a:pPr>
             <a:r>
               <a:rPr sz="1969" dirty="0"/>
-              <a:t>		while(numfull == 0)</a:t>
+              <a:t>		</a:t>
+            </a:r>
+            <a:r>
+              <a:rPr lang="en-US" sz="1969" dirty="0"/>
+              <a:t>if </a:t>
+            </a:r>
+            <a:r>
+              <a:rPr sz="1969" dirty="0"/>
+              <a:t>(numfull == 0)</a:t>
             </a:r>
             <a:r>
               <a:rPr lang="en-US" sz="1969" dirty="0"/>
@@ -38571,11 +38579,11 @@
             </a:pPr>
             <a:r>
               <a:rPr lang="en-US" sz="1969" dirty="0"/>
-              <a:t>		</a:t>
+              <a:t>		if (</a:t>
             </a:r>
             <a:r>
               <a:rPr lang="en-US" sz="1969" dirty="0" err="1"/>
-              <a:t>while(numfull</a:t>
+              <a:t>numfull</a:t>
             </a:r>
             <a:r>
               <a:rPr lang="en-US" sz="1969" dirty="0"/>
@@ -38735,7 +38743,7 @@
           </a:ln>
           <a:extLst>
             <a:ext uri="{C572A759-6A51-4108-AA02-DFA0A04FC94B}">
-              <ma14:wrappingTextBoxFlag xmlns="" xmlns:ma14="http://schemas.microsoft.com/office/mac/drawingml/2011/main" val="1"/>
+              <ma14:wrappingTextBoxFlag xmlns:ma14="http://schemas.microsoft.com/office/mac/drawingml/2011/main" xmlns="" val="1"/>
             </a:ext>
           </a:extLst>
         </p:spPr>
@@ -42512,7 +42520,7 @@
           </a:ln>
           <a:extLst>
             <a:ext uri="{C572A759-6A51-4108-AA02-DFA0A04FC94B}">
-              <ma14:wrappingTextBoxFlag xmlns:ma14="http://schemas.microsoft.com/office/mac/drawingml/2011/main" xmlns="" val="1"/>
+              <ma14:wrappingTextBoxFlag xmlns="" xmlns:ma14="http://schemas.microsoft.com/office/mac/drawingml/2011/main" val="1"/>
             </a:ext>
           </a:extLst>
         </p:spPr>
@@ -42603,7 +42611,7 @@
           </a:ln>
           <a:extLst>
             <a:ext uri="{C572A759-6A51-4108-AA02-DFA0A04FC94B}">
-              <ma14:wrappingTextBoxFlag xmlns:ma14="http://schemas.microsoft.com/office/mac/drawingml/2011/main" xmlns="" val="1"/>
+              <ma14:wrappingTextBoxFlag xmlns="" xmlns:ma14="http://schemas.microsoft.com/office/mac/drawingml/2011/main" val="1"/>
             </a:ext>
           </a:extLst>
         </p:spPr>
@@ -42730,7 +42738,7 @@
           </a:ln>
           <a:extLst>
             <a:ext uri="{C572A759-6A51-4108-AA02-DFA0A04FC94B}">
-              <ma14:wrappingTextBoxFlag xmlns:ma14="http://schemas.microsoft.com/office/mac/drawingml/2011/main" xmlns="" val="1"/>
+              <ma14:wrappingTextBoxFlag xmlns="" xmlns:ma14="http://schemas.microsoft.com/office/mac/drawingml/2011/main" val="1"/>
             </a:ext>
           </a:extLst>
         </p:spPr>
@@ -42836,7 +42844,7 @@
           </a:ln>
           <a:extLst>
             <a:ext uri="{C572A759-6A51-4108-AA02-DFA0A04FC94B}">
-              <ma14:wrappingTextBoxFlag xmlns:ma14="http://schemas.microsoft.com/office/mac/drawingml/2011/main" xmlns="" val="1"/>
+              <ma14:wrappingTextBoxFlag xmlns="" xmlns:ma14="http://schemas.microsoft.com/office/mac/drawingml/2011/main" val="1"/>
             </a:ext>
           </a:extLst>
         </p:spPr>
@@ -42938,7 +42946,7 @@
           </a:ln>
           <a:extLst>
             <a:ext uri="{C572A759-6A51-4108-AA02-DFA0A04FC94B}">
-              <ma14:wrappingTextBoxFlag xmlns:ma14="http://schemas.microsoft.com/office/mac/drawingml/2011/main" xmlns="" val="1"/>
+              <ma14:wrappingTextBoxFlag xmlns="" xmlns:ma14="http://schemas.microsoft.com/office/mac/drawingml/2011/main" val="1"/>
             </a:ext>
           </a:extLst>
         </p:spPr>
@@ -43124,7 +43132,7 @@
           </a:ln>
           <a:extLst>
             <a:ext uri="{C572A759-6A51-4108-AA02-DFA0A04FC94B}">
-              <ma14:wrappingTextBoxFlag xmlns:ma14="http://schemas.microsoft.com/office/mac/drawingml/2011/main" xmlns="" val="1"/>
+              <ma14:wrappingTextBoxFlag xmlns="" xmlns:ma14="http://schemas.microsoft.com/office/mac/drawingml/2011/main" val="1"/>
             </a:ext>
           </a:extLst>
         </p:spPr>
@@ -43496,7 +43504,7 @@
           </a:ln>
           <a:extLst>
             <a:ext uri="{C572A759-6A51-4108-AA02-DFA0A04FC94B}">
-              <ma14:wrappingTextBoxFlag xmlns:ma14="http://schemas.microsoft.com/office/mac/drawingml/2011/main" xmlns="" val="1"/>
+              <ma14:wrappingTextBoxFlag xmlns="" xmlns:ma14="http://schemas.microsoft.com/office/mac/drawingml/2011/main" val="1"/>
             </a:ext>
           </a:extLst>
         </p:spPr>
@@ -43623,7 +43631,7 @@
           </a:ln>
           <a:extLst>
             <a:ext uri="{C572A759-6A51-4108-AA02-DFA0A04FC94B}">
-              <ma14:wrappingTextBoxFlag xmlns:ma14="http://schemas.microsoft.com/office/mac/drawingml/2011/main" xmlns="" val="1"/>
+              <ma14:wrappingTextBoxFlag xmlns="" xmlns:ma14="http://schemas.microsoft.com/office/mac/drawingml/2011/main" val="1"/>
             </a:ext>
           </a:extLst>
         </p:spPr>
@@ -43729,7 +43737,7 @@
           </a:ln>
           <a:extLst>
             <a:ext uri="{C572A759-6A51-4108-AA02-DFA0A04FC94B}">
-              <ma14:wrappingTextBoxFlag xmlns:ma14="http://schemas.microsoft.com/office/mac/drawingml/2011/main" xmlns="" val="1"/>
+              <ma14:wrappingTextBoxFlag xmlns="" xmlns:ma14="http://schemas.microsoft.com/office/mac/drawingml/2011/main" val="1"/>
             </a:ext>
           </a:extLst>
         </p:spPr>
@@ -43831,7 +43839,7 @@
           </a:ln>
           <a:extLst>
             <a:ext uri="{C572A759-6A51-4108-AA02-DFA0A04FC94B}">
-              <ma14:wrappingTextBoxFlag xmlns:ma14="http://schemas.microsoft.com/office/mac/drawingml/2011/main" xmlns="" val="1"/>
+              <ma14:wrappingTextBoxFlag xmlns="" xmlns:ma14="http://schemas.microsoft.com/office/mac/drawingml/2011/main" val="1"/>
             </a:ext>
           </a:extLst>
         </p:spPr>
@@ -44017,7 +44025,7 @@
           </a:ln>
           <a:extLst>
             <a:ext uri="{C572A759-6A51-4108-AA02-DFA0A04FC94B}">
-              <ma14:wrappingTextBoxFlag xmlns:ma14="http://schemas.microsoft.com/office/mac/drawingml/2011/main" xmlns="" val="1"/>
+              <ma14:wrappingTextBoxFlag xmlns="" xmlns:ma14="http://schemas.microsoft.com/office/mac/drawingml/2011/main" val="1"/>
             </a:ext>
           </a:extLst>
         </p:spPr>
@@ -44184,7 +44192,7 @@
           </a:ln>
           <a:extLst>
             <a:ext uri="{C572A759-6A51-4108-AA02-DFA0A04FC94B}">
-              <ma14:wrappingTextBoxFlag xmlns:ma14="http://schemas.microsoft.com/office/mac/drawingml/2011/main" xmlns="" val="1"/>
+              <ma14:wrappingTextBoxFlag xmlns="" xmlns:ma14="http://schemas.microsoft.com/office/mac/drawingml/2011/main" val="1"/>
             </a:ext>
           </a:extLst>
         </p:spPr>
@@ -44269,7 +44277,7 @@
           </a:ln>
           <a:extLst>
             <a:ext uri="{C572A759-6A51-4108-AA02-DFA0A04FC94B}">
-              <ma14:wrappingTextBoxFlag xmlns:ma14="http://schemas.microsoft.com/office/mac/drawingml/2011/main" xmlns="" val="1"/>
+              <ma14:wrappingTextBoxFlag xmlns="" xmlns:ma14="http://schemas.microsoft.com/office/mac/drawingml/2011/main" val="1"/>
             </a:ext>
           </a:extLst>
         </p:spPr>
@@ -44573,7 +44581,7 @@
           </a:ln>
           <a:extLst>
             <a:ext uri="{C572A759-6A51-4108-AA02-DFA0A04FC94B}">
-              <ma14:wrappingTextBoxFlag xmlns:ma14="http://schemas.microsoft.com/office/mac/drawingml/2011/main" xmlns="" val="1"/>
+              <ma14:wrappingTextBoxFlag xmlns="" xmlns:ma14="http://schemas.microsoft.com/office/mac/drawingml/2011/main" val="1"/>
             </a:ext>
           </a:extLst>
         </p:spPr>

</xml_diff>